<commit_message>
Fix a copy&paste mistake in slides 37-38
</commit_message>
<xml_diff>
--- a/Coroutines.pptx
+++ b/Coroutines.pptx
@@ -279,7 +279,7 @@
           <a:p>
             <a:fld id="{CDD12B51-A07B-4A85-A3B1-932B0688B4CC}" type="datetimeFigureOut">
               <a:rPr lang="en-US" smtClean="0"/>
-              <a:t>5/14/2019</a:t>
+              <a:t>5/15/2019</a:t>
             </a:fld>
             <a:endParaRPr lang="en-US"/>
           </a:p>
@@ -1986,7 +1986,7 @@
           <a:p>
             <a:fld id="{DAB194E1-0EAF-40A9-AFA2-4DA83C430D73}" type="datetime1">
               <a:rPr lang="en-US" smtClean="0"/>
-              <a:t>5/14/2019</a:t>
+              <a:t>5/15/2019</a:t>
             </a:fld>
             <a:endParaRPr lang="en-US"/>
           </a:p>
@@ -2184,7 +2184,7 @@
           <a:p>
             <a:fld id="{68A9217B-C873-4E2A-BF9D-723E13E09EE0}" type="datetime1">
               <a:rPr lang="en-US" smtClean="0"/>
-              <a:t>5/14/2019</a:t>
+              <a:t>5/15/2019</a:t>
             </a:fld>
             <a:endParaRPr lang="en-US"/>
           </a:p>
@@ -2392,7 +2392,7 @@
           <a:p>
             <a:fld id="{E19DD4DE-94E4-47DE-8651-09B3E6C9300E}" type="datetime1">
               <a:rPr lang="en-US" smtClean="0"/>
-              <a:t>5/14/2019</a:t>
+              <a:t>5/15/2019</a:t>
             </a:fld>
             <a:endParaRPr lang="en-US"/>
           </a:p>
@@ -2590,7 +2590,7 @@
           <a:p>
             <a:fld id="{161F3313-6AD5-4F75-B07E-667DFA845AB0}" type="datetime1">
               <a:rPr lang="en-US" smtClean="0"/>
-              <a:t>5/14/2019</a:t>
+              <a:t>5/15/2019</a:t>
             </a:fld>
             <a:endParaRPr lang="en-US"/>
           </a:p>
@@ -2865,7 +2865,7 @@
           <a:p>
             <a:fld id="{C127C86F-11AD-4A7F-9647-03E07D5B8BB6}" type="datetime1">
               <a:rPr lang="en-US" smtClean="0"/>
-              <a:t>5/14/2019</a:t>
+              <a:t>5/15/2019</a:t>
             </a:fld>
             <a:endParaRPr lang="en-US"/>
           </a:p>
@@ -3130,7 +3130,7 @@
           <a:p>
             <a:fld id="{CE589DBD-A9AD-46F9-8749-86483F14B57B}" type="datetime1">
               <a:rPr lang="en-US" smtClean="0"/>
-              <a:t>5/14/2019</a:t>
+              <a:t>5/15/2019</a:t>
             </a:fld>
             <a:endParaRPr lang="en-US"/>
           </a:p>
@@ -3542,7 +3542,7 @@
           <a:p>
             <a:fld id="{FBBF6B4F-CE60-42CA-9FBD-479A66257D58}" type="datetime1">
               <a:rPr lang="en-US" smtClean="0"/>
-              <a:t>5/14/2019</a:t>
+              <a:t>5/15/2019</a:t>
             </a:fld>
             <a:endParaRPr lang="en-US"/>
           </a:p>
@@ -3683,7 +3683,7 @@
           <a:p>
             <a:fld id="{7FD5CAFD-6833-419E-AD17-CE379BEEDEEC}" type="datetime1">
               <a:rPr lang="en-US" smtClean="0"/>
-              <a:t>5/14/2019</a:t>
+              <a:t>5/15/2019</a:t>
             </a:fld>
             <a:endParaRPr lang="en-US"/>
           </a:p>
@@ -3796,7 +3796,7 @@
           <a:p>
             <a:fld id="{5CA2972A-CA4B-405A-B303-1164DC439459}" type="datetime1">
               <a:rPr lang="en-US" smtClean="0"/>
-              <a:t>5/14/2019</a:t>
+              <a:t>5/15/2019</a:t>
             </a:fld>
             <a:endParaRPr lang="en-US"/>
           </a:p>
@@ -4107,7 +4107,7 @@
           <a:p>
             <a:fld id="{5AEC2C61-89EE-4E74-B679-0AB3E605858A}" type="datetime1">
               <a:rPr lang="en-US" smtClean="0"/>
-              <a:t>5/14/2019</a:t>
+              <a:t>5/15/2019</a:t>
             </a:fld>
             <a:endParaRPr lang="en-US"/>
           </a:p>
@@ -4395,7 +4395,7 @@
           <a:p>
             <a:fld id="{E3740B8E-3295-403D-87F6-3B256ED06F9F}" type="datetime1">
               <a:rPr lang="en-US" smtClean="0"/>
-              <a:t>5/14/2019</a:t>
+              <a:t>5/15/2019</a:t>
             </a:fld>
             <a:endParaRPr lang="en-US"/>
           </a:p>
@@ -4636,7 +4636,7 @@
           <a:p>
             <a:fld id="{F1E4F559-EC5A-47CF-9A61-84BAE572FDE4}" type="datetime1">
               <a:rPr lang="en-US" smtClean="0"/>
-              <a:t>5/14/2019</a:t>
+              <a:t>5/15/2019</a:t>
             </a:fld>
             <a:endParaRPr lang="en-US"/>
           </a:p>
@@ -29342,7 +29342,7 @@
                             </p:stCondLst>
                             <p:childTnLst>
                               <p:par>
-                                <p:cTn id="5" presetID="1" presetClass="entr" presetSubtype="0" fill="hold" grpId="0" nodeType="clickEffect">
+                                <p:cTn id="5" presetID="1" presetClass="entr" presetSubtype="0" fill="hold" nodeType="clickEffect">
                                   <p:stCondLst>
                                     <p:cond delay="0"/>
                                   </p:stCondLst>
@@ -29391,7 +29391,7 @@
                             </p:stCondLst>
                             <p:childTnLst>
                               <p:par>
-                                <p:cTn id="9" presetID="1" presetClass="entr" presetSubtype="0" fill="hold" grpId="0" nodeType="clickEffect">
+                                <p:cTn id="9" presetID="1" presetClass="entr" presetSubtype="0" fill="hold" nodeType="clickEffect">
                                   <p:stCondLst>
                                     <p:cond delay="0"/>
                                   </p:stCondLst>
@@ -29440,7 +29440,7 @@
                             </p:stCondLst>
                             <p:childTnLst>
                               <p:par>
-                                <p:cTn id="13" presetID="1" presetClass="entr" presetSubtype="0" fill="hold" grpId="0" nodeType="clickEffect">
+                                <p:cTn id="13" presetID="1" presetClass="entr" presetSubtype="0" fill="hold" nodeType="clickEffect">
                                   <p:stCondLst>
                                     <p:cond delay="0"/>
                                   </p:stCondLst>
@@ -29489,7 +29489,7 @@
                             </p:stCondLst>
                             <p:childTnLst>
                               <p:par>
-                                <p:cTn id="17" presetID="1" presetClass="entr" presetSubtype="0" fill="hold" grpId="0" nodeType="clickEffect">
+                                <p:cTn id="17" presetID="1" presetClass="entr" presetSubtype="0" fill="hold" nodeType="clickEffect">
                                   <p:stCondLst>
                                     <p:cond delay="0"/>
                                   </p:stCondLst>
@@ -29538,7 +29538,7 @@
                             </p:stCondLst>
                             <p:childTnLst>
                               <p:par>
-                                <p:cTn id="21" presetID="1" presetClass="entr" presetSubtype="0" fill="hold" grpId="0" nodeType="clickEffect">
+                                <p:cTn id="21" presetID="1" presetClass="entr" presetSubtype="0" fill="hold" nodeType="clickEffect">
                                   <p:stCondLst>
                                     <p:cond delay="0"/>
                                   </p:stCondLst>
@@ -29587,7 +29587,7 @@
                             </p:stCondLst>
                             <p:childTnLst>
                               <p:par>
-                                <p:cTn id="25" presetID="1" presetClass="entr" presetSubtype="0" fill="hold" grpId="0" nodeType="clickEffect">
+                                <p:cTn id="25" presetID="1" presetClass="entr" presetSubtype="0" fill="hold" nodeType="clickEffect">
                                   <p:stCondLst>
                                     <p:cond delay="0"/>
                                   </p:stCondLst>
@@ -31553,7 +31553,7 @@
                 </a:solidFill>
                 <a:latin typeface="Consolas" panose="020B0609020204030204" pitchFamily="49" charset="0"/>
               </a:rPr>
-              <a:t>vector</a:t>
+              <a:t>string</a:t>
             </a:r>
             <a:r>
               <a:rPr lang="en-US" sz="2000" dirty="0">
@@ -31562,43 +31562,7 @@
                 </a:solidFill>
                 <a:latin typeface="Consolas" panose="020B0609020204030204" pitchFamily="49" charset="0"/>
               </a:rPr>
-              <a:t>&lt;</a:t>
-            </a:r>
-            <a:r>
-              <a:rPr lang="en-US" sz="2000" dirty="0">
-                <a:solidFill>
-                  <a:srgbClr val="0000FF"/>
-                </a:solidFill>
-                <a:latin typeface="Consolas" panose="020B0609020204030204" pitchFamily="49" charset="0"/>
-              </a:rPr>
-              <a:t>std</a:t>
-            </a:r>
-            <a:r>
-              <a:rPr lang="en-US" sz="2000" dirty="0">
-                <a:solidFill>
-                  <a:srgbClr val="000000"/>
-                </a:solidFill>
-                <a:latin typeface="Consolas" panose="020B0609020204030204" pitchFamily="49" charset="0"/>
-              </a:rPr>
-              <a:t>::</a:t>
-            </a:r>
-            <a:r>
-              <a:rPr lang="en-US" sz="2000" i="1" dirty="0">
-                <a:solidFill>
-                  <a:srgbClr val="0000FF"/>
-                </a:solidFill>
-                <a:latin typeface="Consolas" panose="020B0609020204030204" pitchFamily="49" charset="0"/>
-              </a:rPr>
-              <a:t>string</a:t>
-            </a:r>
-            <a:r>
-              <a:rPr lang="en-US" sz="2000" dirty="0">
-                <a:solidFill>
-                  <a:srgbClr val="000000"/>
-                </a:solidFill>
-                <a:latin typeface="Consolas" panose="020B0609020204030204" pitchFamily="49" charset="0"/>
-              </a:rPr>
-              <a:t>&gt;&gt; </a:t>
+              <a:t>&gt; </a:t>
             </a:r>
             <a:r>
               <a:rPr lang="en-US" sz="2000" dirty="0" err="1">
@@ -32610,7 +32574,7 @@
                 </a:solidFill>
                 <a:latin typeface="Consolas" panose="020B0609020204030204" pitchFamily="49" charset="0"/>
               </a:rPr>
-              <a:t>vector</a:t>
+              <a:t>string</a:t>
             </a:r>
             <a:r>
               <a:rPr lang="en-US" sz="2000" dirty="0">
@@ -32619,43 +32583,7 @@
                 </a:solidFill>
                 <a:latin typeface="Consolas" panose="020B0609020204030204" pitchFamily="49" charset="0"/>
               </a:rPr>
-              <a:t>&lt;</a:t>
-            </a:r>
-            <a:r>
-              <a:rPr lang="en-US" sz="2000" dirty="0">
-                <a:solidFill>
-                  <a:srgbClr val="0000FF"/>
-                </a:solidFill>
-                <a:latin typeface="Consolas" panose="020B0609020204030204" pitchFamily="49" charset="0"/>
-              </a:rPr>
-              <a:t>std</a:t>
-            </a:r>
-            <a:r>
-              <a:rPr lang="en-US" sz="2000" dirty="0">
-                <a:solidFill>
-                  <a:srgbClr val="000000"/>
-                </a:solidFill>
-                <a:latin typeface="Consolas" panose="020B0609020204030204" pitchFamily="49" charset="0"/>
-              </a:rPr>
-              <a:t>::</a:t>
-            </a:r>
-            <a:r>
-              <a:rPr lang="en-US" sz="2000" i="1" dirty="0">
-                <a:solidFill>
-                  <a:srgbClr val="0000FF"/>
-                </a:solidFill>
-                <a:latin typeface="Consolas" panose="020B0609020204030204" pitchFamily="49" charset="0"/>
-              </a:rPr>
-              <a:t>string</a:t>
-            </a:r>
-            <a:r>
-              <a:rPr lang="en-US" sz="2000" dirty="0">
-                <a:solidFill>
-                  <a:srgbClr val="000000"/>
-                </a:solidFill>
-                <a:latin typeface="Consolas" panose="020B0609020204030204" pitchFamily="49" charset="0"/>
-              </a:rPr>
-              <a:t>&gt;&gt; </a:t>
+              <a:t>&gt; </a:t>
             </a:r>
             <a:r>
               <a:rPr lang="en-US" sz="2000" dirty="0" err="1">

</xml_diff>